<commit_message>
Updated Symbols list for more consistency, added more information to Presentation title slide
</commit_message>
<xml_diff>
--- a/Presentation/PowerPoint_Template.pptx
+++ b/Presentation/PowerPoint_Template.pptx
@@ -201,7 +201,7 @@
           <a:p>
             <a:fld id="{BCDB334D-D17F-49C4-91DD-37BB7E818209}" type="datetimeFigureOut">
               <a:rPr lang="de-CH" smtClean="0"/>
-              <a:t>26.09.13</a:t>
+              <a:t>27/05/14</a:t>
             </a:fld>
             <a:endParaRPr lang="de-CH"/>
           </a:p>
@@ -626,7 +626,7 @@
           <a:p>
             <a:fld id="{92BF4FBE-0522-49A2-A01E-13F521B4C0B7}" type="datetime1">
               <a:rPr lang="de-DE" smtClean="0"/>
-              <a:t>26.09.13</a:t>
+              <a:t>27/05/14</a:t>
             </a:fld>
             <a:endParaRPr lang="de-DE"/>
           </a:p>
@@ -851,7 +851,7 @@
           <a:p>
             <a:fld id="{681F6098-E9E1-42B4-9C80-2F52B9453439}" type="datetime1">
               <a:rPr lang="de-DE" smtClean="0"/>
-              <a:t>26.09.13</a:t>
+              <a:t>27/05/14</a:t>
             </a:fld>
             <a:endParaRPr lang="de-DE"/>
           </a:p>
@@ -1123,7 +1123,7 @@
           <a:p>
             <a:fld id="{0E397BD4-0686-495C-8D8F-54DB8CB790DF}" type="datetime1">
               <a:rPr lang="de-DE" smtClean="0"/>
-              <a:t>26.09.13</a:t>
+              <a:t>27/05/14</a:t>
             </a:fld>
             <a:endParaRPr lang="de-DE"/>
           </a:p>
@@ -1432,7 +1432,7 @@
           <a:p>
             <a:fld id="{0E397BD4-0686-495C-8D8F-54DB8CB790DF}" type="datetime1">
               <a:rPr lang="de-DE" smtClean="0"/>
-              <a:t>26.09.13</a:t>
+              <a:t>27/05/14</a:t>
             </a:fld>
             <a:endParaRPr lang="de-DE"/>
           </a:p>
@@ -2035,7 +2035,7 @@
           <a:p>
             <a:fld id="{3B2F6CB8-9391-4BED-909F-C47A979AE1C4}" type="datetime1">
               <a:rPr lang="de-DE" smtClean="0"/>
-              <a:t>26.09.13</a:t>
+              <a:t>27/05/14</a:t>
             </a:fld>
             <a:endParaRPr lang="de-DE"/>
           </a:p>
@@ -2368,7 +2368,7 @@
           <a:p>
             <a:fld id="{C6A1628A-2A40-4B37-B167-309C0EBB4BBF}" type="datetime1">
               <a:rPr lang="de-DE" smtClean="0"/>
-              <a:t>26.09.13</a:t>
+              <a:t>27/05/14</a:t>
             </a:fld>
             <a:endParaRPr lang="de-DE"/>
           </a:p>
@@ -2492,7 +2492,7 @@
           <a:p>
             <a:fld id="{64AE1E89-2EE0-4320-B5A2-F15E505D5862}" type="datetime1">
               <a:rPr lang="de-DE" smtClean="0"/>
-              <a:t>26.09.13</a:t>
+              <a:t>27/05/14</a:t>
             </a:fld>
             <a:endParaRPr lang="de-DE"/>
           </a:p>
@@ -2619,7 +2619,7 @@
           <a:p>
             <a:fld id="{7D860B62-60FD-48EF-B2F4-6E7265AD3459}" type="datetime1">
               <a:rPr lang="de-DE" smtClean="0"/>
-              <a:t>26.09.13</a:t>
+              <a:t>27/05/14</a:t>
             </a:fld>
             <a:endParaRPr lang="de-DE"/>
           </a:p>
@@ -2762,7 +2762,7 @@
           <a:p>
             <a:fld id="{7F4A91D9-FBFE-4ACC-A99A-BC74A6E03CC5}" type="datetime1">
               <a:rPr lang="de-DE" smtClean="0"/>
-              <a:t>26.09.13</a:t>
+              <a:t>27/05/14</a:t>
             </a:fld>
             <a:endParaRPr lang="de-DE"/>
           </a:p>
@@ -3158,7 +3158,7 @@
           <a:p>
             <a:fld id="{BD23B19E-8C35-419D-B8B2-87612A89E43F}" type="datetime1">
               <a:rPr lang="de-DE" smtClean="0"/>
-              <a:t>26.09.13</a:t>
+              <a:t>27/05/14</a:t>
             </a:fld>
             <a:endParaRPr lang="de-DE" dirty="0"/>
           </a:p>
@@ -3811,7 +3811,59 @@
           <a:bodyPr/>
           <a:lstStyle/>
           <a:p>
-            <a:endParaRPr lang="de-CH"/>
+            <a:r>
+              <a:rPr lang="de-CH" b="1" dirty="0" smtClean="0"/>
+              <a:t>((</a:t>
+            </a:r>
+            <a:r>
+              <a:rPr lang="de-CH" b="1" dirty="0" err="1" smtClean="0"/>
+              <a:t>Your</a:t>
+            </a:r>
+            <a:r>
+              <a:rPr lang="de-CH" b="1" dirty="0" smtClean="0"/>
+              <a:t> Name))</a:t>
+            </a:r>
+          </a:p>
+          <a:p>
+            <a:endParaRPr lang="de-CH" dirty="0" smtClean="0"/>
+          </a:p>
+          <a:p>
+            <a:r>
+              <a:rPr lang="de-CH" dirty="0"/>
+              <a:t>((Studies on </a:t>
+            </a:r>
+            <a:r>
+              <a:rPr lang="de-CH" dirty="0" err="1"/>
+              <a:t>Mechatronics</a:t>
+            </a:r>
+            <a:r>
+              <a:rPr lang="de-CH" dirty="0"/>
+              <a:t>, Bachelor Thesis, Semester Thesis, Master Thesis)</a:t>
+            </a:r>
+            <a:r>
+              <a:rPr lang="de-CH" dirty="0" smtClean="0"/>
+              <a:t>)</a:t>
+            </a:r>
+            <a:endParaRPr lang="de-CH" dirty="0"/>
+          </a:p>
+          <a:p>
+            <a:r>
+              <a:rPr lang="de-CH" dirty="0" err="1" smtClean="0"/>
+              <a:t>Supervised</a:t>
+            </a:r>
+            <a:r>
+              <a:rPr lang="de-CH" dirty="0" smtClean="0"/>
+              <a:t> </a:t>
+            </a:r>
+            <a:r>
+              <a:rPr lang="de-CH" dirty="0" err="1" smtClean="0"/>
+              <a:t>by</a:t>
+            </a:r>
+            <a:r>
+              <a:rPr lang="de-CH" dirty="0" smtClean="0"/>
+              <a:t> ...</a:t>
+            </a:r>
+            <a:endParaRPr lang="de-CH" dirty="0"/>
           </a:p>
         </p:txBody>
       </p:sp>
@@ -3832,7 +3884,7 @@
           <a:p>
             <a:fld id="{92BF4FBE-0522-49A2-A01E-13F521B4C0B7}" type="datetime1">
               <a:rPr lang="de-DE" smtClean="0"/>
-              <a:t>26.09.13</a:t>
+              <a:t>27/05/14</a:t>
             </a:fld>
             <a:endParaRPr lang="de-DE"/>
           </a:p>
@@ -3972,7 +4024,7 @@
           <a:p>
             <a:fld id="{681F6098-E9E1-42B4-9C80-2F52B9453439}" type="datetime1">
               <a:rPr lang="de-DE" smtClean="0"/>
-              <a:t>26.09.13</a:t>
+              <a:t>27/05/14</a:t>
             </a:fld>
             <a:endParaRPr lang="de-DE"/>
           </a:p>
@@ -4112,7 +4164,7 @@
           <a:p>
             <a:fld id="{0E397BD4-0686-495C-8D8F-54DB8CB790DF}" type="datetime1">
               <a:rPr lang="de-DE" smtClean="0"/>
-              <a:t>26.09.13</a:t>
+              <a:t>27/05/14</a:t>
             </a:fld>
             <a:endParaRPr lang="de-DE"/>
           </a:p>
@@ -4264,7 +4316,7 @@
           <a:p>
             <a:fld id="{0E397BD4-0686-495C-8D8F-54DB8CB790DF}" type="datetime1">
               <a:rPr lang="de-DE" smtClean="0"/>
-              <a:t>26.09.13</a:t>
+              <a:t>27/05/14</a:t>
             </a:fld>
             <a:endParaRPr lang="de-DE"/>
           </a:p>
@@ -4468,7 +4520,7 @@
           <a:p>
             <a:fld id="{3B2F6CB8-9391-4BED-909F-C47A979AE1C4}" type="datetime1">
               <a:rPr lang="de-DE" smtClean="0"/>
-              <a:t>26.09.13</a:t>
+              <a:t>27/05/14</a:t>
             </a:fld>
             <a:endParaRPr lang="de-DE"/>
           </a:p>
@@ -4627,7 +4679,7 @@
           <a:p>
             <a:fld id="{C6A1628A-2A40-4B37-B167-309C0EBB4BBF}" type="datetime1">
               <a:rPr lang="de-DE" smtClean="0"/>
-              <a:t>26.09.13</a:t>
+              <a:t>27/05/14</a:t>
             </a:fld>
             <a:endParaRPr lang="de-DE"/>
           </a:p>
@@ -4748,7 +4800,7 @@
           <a:p>
             <a:fld id="{64AE1E89-2EE0-4320-B5A2-F15E505D5862}" type="datetime1">
               <a:rPr lang="de-DE" smtClean="0"/>
-              <a:t>26.09.13</a:t>
+              <a:t>27/05/14</a:t>
             </a:fld>
             <a:endParaRPr lang="de-DE"/>
           </a:p>
@@ -4869,7 +4921,7 @@
           <a:p>
             <a:fld id="{7D860B62-60FD-48EF-B2F4-6E7265AD3459}" type="datetime1">
               <a:rPr lang="de-DE" smtClean="0"/>
-              <a:t>26.09.13</a:t>
+              <a:t>27/05/14</a:t>
             </a:fld>
             <a:endParaRPr lang="de-DE"/>
           </a:p>
@@ -4983,7 +5035,7 @@
           <a:p>
             <a:fld id="{7F4A91D9-FBFE-4ACC-A99A-BC74A6E03CC5}" type="datetime1">
               <a:rPr lang="de-DE" smtClean="0"/>
-              <a:t>26.09.13</a:t>
+              <a:t>27/05/14</a:t>
             </a:fld>
             <a:endParaRPr lang="de-DE"/>
           </a:p>

</xml_diff>